<commit_message>
add WLAN and UI data
</commit_message>
<xml_diff>
--- a/NodeA - Infoblatt.pptx
+++ b/NodeA - Infoblatt.pptx
@@ -256,7 +256,7 @@
           <a:p>
             <a:fld id="{90474353-4CFC-45E5-A931-01EA02C915AC}" type="datetimeFigureOut">
               <a:rPr lang="en-GB" smtClean="0"/>
-              <a:t>03/09/2018</a:t>
+              <a:t>06/09/2018</a:t>
             </a:fld>
             <a:endParaRPr lang="en-GB"/>
           </a:p>
@@ -322,7 +322,7 @@
           <a:p>
             <a:fld id="{A0C1DFBA-0857-4073-B07A-F776BC5881A8}" type="slidenum">
               <a:rPr lang="en-GB" smtClean="0"/>
-              <a:t>‹Nr.›</a:t>
+              <a:t>‹#›</a:t>
             </a:fld>
             <a:endParaRPr lang="en-GB"/>
           </a:p>
@@ -421,7 +421,7 @@
           <a:p>
             <a:fld id="{5212813A-629E-4687-9C4C-C5B2AEF1C6D1}" type="datetimeFigureOut">
               <a:rPr lang="de-DE" smtClean="0"/>
-              <a:t>03.09.2018</a:t>
+              <a:t>06.09.18</a:t>
             </a:fld>
             <a:endParaRPr lang="de-DE"/>
           </a:p>
@@ -580,7 +580,7 @@
           <a:p>
             <a:fld id="{40822BA9-48BD-4664-8100-0107637195C6}" type="slidenum">
               <a:rPr lang="de-DE" smtClean="0"/>
-              <a:t>‹Nr.›</a:t>
+              <a:t>‹#›</a:t>
             </a:fld>
             <a:endParaRPr lang="de-DE"/>
           </a:p>
@@ -1493,7 +1493,7 @@
             <a:fld id="{F219A1F5-B91F-4AB0-9BCF-8F2B2D26DDB9}" type="slidenum">
               <a:rPr lang="de-DE" smtClean="0"/>
               <a:pPr/>
-              <a:t>‹Nr.›</a:t>
+              <a:t>‹#›</a:t>
             </a:fld>
             <a:endParaRPr lang="de-DE" dirty="0"/>
           </a:p>
@@ -1800,7 +1800,7 @@
             <a:fld id="{F219A1F5-B91F-4AB0-9BCF-8F2B2D26DDB9}" type="slidenum">
               <a:rPr lang="de-DE" smtClean="0"/>
               <a:pPr/>
-              <a:t>‹Nr.›</a:t>
+              <a:t>‹#›</a:t>
             </a:fld>
             <a:endParaRPr lang="de-DE" dirty="0"/>
           </a:p>
@@ -2262,7 +2262,7 @@
             <a:fld id="{F219A1F5-B91F-4AB0-9BCF-8F2B2D26DDB9}" type="slidenum">
               <a:rPr lang="de-DE" smtClean="0"/>
               <a:pPr/>
-              <a:t>‹Nr.›</a:t>
+              <a:t>‹#›</a:t>
             </a:fld>
             <a:endParaRPr lang="de-DE" dirty="0"/>
           </a:p>
@@ -2743,7 +2743,7 @@
             <a:fld id="{F219A1F5-B91F-4AB0-9BCF-8F2B2D26DDB9}" type="slidenum">
               <a:rPr lang="de-DE" smtClean="0"/>
               <a:pPr/>
-              <a:t>‹Nr.›</a:t>
+              <a:t>‹#›</a:t>
             </a:fld>
             <a:endParaRPr lang="de-DE" dirty="0"/>
           </a:p>
@@ -4316,7 +4316,7 @@
           <a:p>
             <a:fld id="{D3EB3054-B75A-4BD7-8B3E-8DC0F614FAF3}" type="datetimeFigureOut">
               <a:rPr lang="de-DE" smtClean="0"/>
-              <a:t>03.09.2018</a:t>
+              <a:t>06.09.18</a:t>
             </a:fld>
             <a:endParaRPr lang="de-DE"/>
           </a:p>
@@ -4358,7 +4358,7 @@
           <a:p>
             <a:fld id="{802006FE-6571-4354-8775-F8708372C227}" type="slidenum">
               <a:rPr lang="de-DE" smtClean="0"/>
-              <a:t>‹Nr.›</a:t>
+              <a:t>‹#›</a:t>
             </a:fld>
             <a:endParaRPr lang="de-DE"/>
           </a:p>
@@ -4824,7 +4824,7 @@
           <p:cNvPr id="65" name="Grafik 64">
             <a:extLst>
               <a:ext uri="{FF2B5EF4-FFF2-40B4-BE49-F238E27FC236}">
-                <a16:creationId xmlns:a16="http://schemas.microsoft.com/office/drawing/2014/main" id="{1FA85115-D3F9-446D-B530-CAF43F823B67}"/>
+                <a16:creationId xmlns:a16="http://schemas.microsoft.com/office/drawing/2014/main" xmlns="" id="{1FA85115-D3F9-446D-B530-CAF43F823B67}"/>
               </a:ext>
             </a:extLst>
           </p:cNvPr>
@@ -4846,7 +4846,7 @@
         </p:blipFill>
         <p:spPr>
           <a:xfrm rot="3813831">
-            <a:off x="3266727" y="3567050"/>
+            <a:off x="3451349" y="3587236"/>
             <a:ext cx="2060359" cy="2060359"/>
           </a:xfrm>
           <a:prstGeom prst="rect">
@@ -4856,10 +4856,10 @@
       </p:pic>
       <p:sp>
         <p:nvSpPr>
-          <p:cNvPr id="6" name="Textfeld 5">
+          <p:cNvPr id="69" name="Textfeld 68">
             <a:extLst>
               <a:ext uri="{FF2B5EF4-FFF2-40B4-BE49-F238E27FC236}">
-                <a16:creationId xmlns:a16="http://schemas.microsoft.com/office/drawing/2014/main" id="{C95FFDAC-DA20-4520-BE3D-68F2A2ED8CE9}"/>
+                <a16:creationId xmlns:a16="http://schemas.microsoft.com/office/drawing/2014/main" xmlns="" id="{15092FC3-83E6-4A54-8554-45EE4F8A170C}"/>
               </a:ext>
             </a:extLst>
           </p:cNvPr>
@@ -4868,106 +4868,6 @@
         </p:nvSpPr>
         <p:spPr>
           <a:xfrm>
-            <a:off x="6774895" y="4507569"/>
-            <a:ext cx="1980000" cy="923330"/>
-          </a:xfrm>
-          <a:prstGeom prst="rect">
-            <a:avLst/>
-          </a:prstGeom>
-          <a:noFill/>
-        </p:spPr>
-        <p:txBody>
-          <a:bodyPr wrap="square" rtlCol="0">
-            <a:spAutoFit/>
-          </a:bodyPr>
-          <a:lstStyle/>
-          <a:p>
-            <a:r>
-              <a:rPr lang="de-DE" dirty="0"/>
-              <a:t>Switch LED </a:t>
-            </a:r>
-            <a:r>
-              <a:rPr lang="de-DE" b="1" dirty="0"/>
-              <a:t>aller Nodes </a:t>
-            </a:r>
-            <a:r>
-              <a:rPr lang="de-DE" dirty="0"/>
-              <a:t>mit Farbe des </a:t>
-            </a:r>
-            <a:r>
-              <a:rPr lang="de-DE" dirty="0" smtClean="0"/>
-              <a:t>aktuellen </a:t>
-            </a:r>
-            <a:r>
-              <a:rPr lang="de-DE" dirty="0" err="1"/>
-              <a:t>Node</a:t>
-            </a:r>
-            <a:endParaRPr lang="de-DE" dirty="0"/>
-          </a:p>
-        </p:txBody>
-      </p:sp>
-      <p:sp>
-        <p:nvSpPr>
-          <p:cNvPr id="68" name="Textfeld 67">
-            <a:extLst>
-              <a:ext uri="{FF2B5EF4-FFF2-40B4-BE49-F238E27FC236}">
-                <a16:creationId xmlns:a16="http://schemas.microsoft.com/office/drawing/2014/main" id="{247C3AE9-29F0-4155-9C33-AC10D5C72298}"/>
-              </a:ext>
-            </a:extLst>
-          </p:cNvPr>
-          <p:cNvSpPr txBox="1"/>
-          <p:nvPr/>
-        </p:nvSpPr>
-        <p:spPr>
-          <a:xfrm>
-            <a:off x="467544" y="4507569"/>
-            <a:ext cx="1980000" cy="923330"/>
-          </a:xfrm>
-          <a:prstGeom prst="rect">
-            <a:avLst/>
-          </a:prstGeom>
-          <a:noFill/>
-        </p:spPr>
-        <p:txBody>
-          <a:bodyPr wrap="square" rtlCol="0">
-            <a:spAutoFit/>
-          </a:bodyPr>
-          <a:lstStyle/>
-          <a:p>
-            <a:pPr algn="r"/>
-            <a:r>
-              <a:rPr lang="de-DE" dirty="0"/>
-              <a:t>Switch LED des </a:t>
-            </a:r>
-            <a:r>
-              <a:rPr lang="de-DE" b="1" dirty="0"/>
-              <a:t>aktuellen </a:t>
-            </a:r>
-            <a:r>
-              <a:rPr lang="de-DE" b="1" dirty="0" err="1"/>
-              <a:t>Node</a:t>
-            </a:r>
-            <a:r>
-              <a:rPr lang="de-DE" dirty="0"/>
-              <a:t> mit Zufallsfarbe</a:t>
-            </a:r>
-          </a:p>
-        </p:txBody>
-      </p:sp>
-      <p:sp>
-        <p:nvSpPr>
-          <p:cNvPr id="69" name="Textfeld 68">
-            <a:extLst>
-              <a:ext uri="{FF2B5EF4-FFF2-40B4-BE49-F238E27FC236}">
-                <a16:creationId xmlns:a16="http://schemas.microsoft.com/office/drawing/2014/main" id="{15092FC3-83E6-4A54-8554-45EE4F8A170C}"/>
-              </a:ext>
-            </a:extLst>
-          </p:cNvPr>
-          <p:cNvSpPr txBox="1"/>
-          <p:nvPr/>
-        </p:nvSpPr>
-        <p:spPr>
-          <a:xfrm>
             <a:off x="3243200" y="2387126"/>
             <a:ext cx="2737693" cy="923330"/>
           </a:xfrm>
@@ -5019,7 +4919,7 @@
           <p:cNvPr id="10" name="Rechteck 9">
             <a:extLst>
               <a:ext uri="{FF2B5EF4-FFF2-40B4-BE49-F238E27FC236}">
-                <a16:creationId xmlns:a16="http://schemas.microsoft.com/office/drawing/2014/main" id="{1A8B9D85-1738-4259-9F53-360B3A5DDBAD}"/>
+                <a16:creationId xmlns:a16="http://schemas.microsoft.com/office/drawing/2014/main" xmlns="" id="{1A8B9D85-1738-4259-9F53-360B3A5DDBAD}"/>
               </a:ext>
             </a:extLst>
           </p:cNvPr>
@@ -5139,174 +5039,12 @@
           </a:p>
         </p:txBody>
       </p:sp>
-      <p:cxnSp>
-        <p:nvCxnSpPr>
-          <p:cNvPr id="12" name="Gerade Verbindung mit Pfeil 11">
-            <a:extLst>
-              <a:ext uri="{FF2B5EF4-FFF2-40B4-BE49-F238E27FC236}">
-                <a16:creationId xmlns:a16="http://schemas.microsoft.com/office/drawing/2014/main" id="{A9E05237-C9E6-47A6-8D3A-08F14FB54B39}"/>
-              </a:ext>
-            </a:extLst>
-          </p:cNvPr>
-          <p:cNvCxnSpPr/>
-          <p:nvPr/>
-        </p:nvCxnSpPr>
-        <p:spPr>
-          <a:xfrm flipH="1">
-            <a:off x="2447544" y="5157192"/>
-            <a:ext cx="1763744" cy="0"/>
-          </a:xfrm>
-          <a:prstGeom prst="straightConnector1">
-            <a:avLst/>
-          </a:prstGeom>
-          <a:ln w="76200">
-            <a:tailEnd type="triangle"/>
-          </a:ln>
-        </p:spPr>
-        <p:style>
-          <a:lnRef idx="1">
-            <a:schemeClr val="accent1"/>
-          </a:lnRef>
-          <a:fillRef idx="0">
-            <a:schemeClr val="accent1"/>
-          </a:fillRef>
-          <a:effectRef idx="0">
-            <a:schemeClr val="accent1"/>
-          </a:effectRef>
-          <a:fontRef idx="minor">
-            <a:schemeClr val="tx1"/>
-          </a:fontRef>
-        </p:style>
-      </p:cxnSp>
-      <p:cxnSp>
-        <p:nvCxnSpPr>
-          <p:cNvPr id="71" name="Gerade Verbindung mit Pfeil 70">
-            <a:extLst>
-              <a:ext uri="{FF2B5EF4-FFF2-40B4-BE49-F238E27FC236}">
-                <a16:creationId xmlns:a16="http://schemas.microsoft.com/office/drawing/2014/main" id="{6AD7A631-04AB-4CAF-8316-F9D28F8E30AF}"/>
-              </a:ext>
-            </a:extLst>
-          </p:cNvPr>
-          <p:cNvCxnSpPr>
-            <a:cxnSpLocks/>
-          </p:cNvCxnSpPr>
-          <p:nvPr/>
-        </p:nvCxnSpPr>
-        <p:spPr>
-          <a:xfrm>
-            <a:off x="2447544" y="4797152"/>
-            <a:ext cx="1763744" cy="0"/>
-          </a:xfrm>
-          <a:prstGeom prst="straightConnector1">
-            <a:avLst/>
-          </a:prstGeom>
-          <a:ln w="76200">
-            <a:tailEnd type="triangle"/>
-          </a:ln>
-        </p:spPr>
-        <p:style>
-          <a:lnRef idx="1">
-            <a:schemeClr val="accent1"/>
-          </a:lnRef>
-          <a:fillRef idx="0">
-            <a:schemeClr val="accent1"/>
-          </a:fillRef>
-          <a:effectRef idx="0">
-            <a:schemeClr val="accent1"/>
-          </a:effectRef>
-          <a:fontRef idx="minor">
-            <a:schemeClr val="tx1"/>
-          </a:fontRef>
-        </p:style>
-      </p:cxnSp>
-      <p:cxnSp>
-        <p:nvCxnSpPr>
-          <p:cNvPr id="73" name="Gerade Verbindung mit Pfeil 72">
-            <a:extLst>
-              <a:ext uri="{FF2B5EF4-FFF2-40B4-BE49-F238E27FC236}">
-                <a16:creationId xmlns:a16="http://schemas.microsoft.com/office/drawing/2014/main" id="{F6EE217F-69B1-465C-919D-69420820ED3A}"/>
-              </a:ext>
-            </a:extLst>
-          </p:cNvPr>
-          <p:cNvCxnSpPr>
-            <a:cxnSpLocks/>
-          </p:cNvCxnSpPr>
-          <p:nvPr/>
-        </p:nvCxnSpPr>
-        <p:spPr>
-          <a:xfrm>
-            <a:off x="5011151" y="5157192"/>
-            <a:ext cx="1763744" cy="0"/>
-          </a:xfrm>
-          <a:prstGeom prst="straightConnector1">
-            <a:avLst/>
-          </a:prstGeom>
-          <a:ln w="76200">
-            <a:tailEnd type="triangle"/>
-          </a:ln>
-        </p:spPr>
-        <p:style>
-          <a:lnRef idx="1">
-            <a:schemeClr val="accent5"/>
-          </a:lnRef>
-          <a:fillRef idx="0">
-            <a:schemeClr val="accent5"/>
-          </a:fillRef>
-          <a:effectRef idx="0">
-            <a:schemeClr val="accent5"/>
-          </a:effectRef>
-          <a:fontRef idx="minor">
-            <a:schemeClr val="tx1"/>
-          </a:fontRef>
-        </p:style>
-      </p:cxnSp>
-      <p:cxnSp>
-        <p:nvCxnSpPr>
-          <p:cNvPr id="74" name="Gerade Verbindung mit Pfeil 73">
-            <a:extLst>
-              <a:ext uri="{FF2B5EF4-FFF2-40B4-BE49-F238E27FC236}">
-                <a16:creationId xmlns:a16="http://schemas.microsoft.com/office/drawing/2014/main" id="{E7F0E0A9-4EF9-4714-A6C6-D8B76A22FE3F}"/>
-              </a:ext>
-            </a:extLst>
-          </p:cNvPr>
-          <p:cNvCxnSpPr>
-            <a:cxnSpLocks/>
-          </p:cNvCxnSpPr>
-          <p:nvPr/>
-        </p:nvCxnSpPr>
-        <p:spPr>
-          <a:xfrm flipH="1">
-            <a:off x="5011151" y="4797152"/>
-            <a:ext cx="1763744" cy="0"/>
-          </a:xfrm>
-          <a:prstGeom prst="straightConnector1">
-            <a:avLst/>
-          </a:prstGeom>
-          <a:ln w="76200">
-            <a:tailEnd type="triangle"/>
-          </a:ln>
-        </p:spPr>
-        <p:style>
-          <a:lnRef idx="1">
-            <a:schemeClr val="accent5"/>
-          </a:lnRef>
-          <a:fillRef idx="0">
-            <a:schemeClr val="accent5"/>
-          </a:fillRef>
-          <a:effectRef idx="0">
-            <a:schemeClr val="accent5"/>
-          </a:effectRef>
-          <a:fontRef idx="minor">
-            <a:schemeClr val="tx1"/>
-          </a:fontRef>
-        </p:style>
-      </p:cxnSp>
       <p:sp>
         <p:nvSpPr>
           <p:cNvPr id="53" name="Textfeld 52">
             <a:extLst>
               <a:ext uri="{FF2B5EF4-FFF2-40B4-BE49-F238E27FC236}">
-                <a16:creationId xmlns:a16="http://schemas.microsoft.com/office/drawing/2014/main" id="{4FE8D939-07A1-47BD-BA00-75AE8A39C701}"/>
+                <a16:creationId xmlns:a16="http://schemas.microsoft.com/office/drawing/2014/main" xmlns="" id="{4FE8D939-07A1-47BD-BA00-75AE8A39C701}"/>
               </a:ext>
             </a:extLst>
           </p:cNvPr>
@@ -5341,6 +5079,212 @@
               <a:rPr lang="de-DE" sz="1050" dirty="0"/>
               <a:t> verfügbar, welche über WLAN mit einem MQTT-Broker kommunizieren</a:t>
             </a:r>
+          </a:p>
+        </p:txBody>
+      </p:sp>
+      <p:sp>
+        <p:nvSpPr>
+          <p:cNvPr id="7" name="Curved Right Arrow 6"/>
+          <p:cNvSpPr/>
+          <p:nvPr/>
+        </p:nvSpPr>
+        <p:spPr bwMode="auto">
+          <a:xfrm rot="19632675">
+            <a:off x="1852300" y="2192401"/>
+            <a:ext cx="936104" cy="3792159"/>
+          </a:xfrm>
+          <a:prstGeom prst="curvedRightArrow">
+            <a:avLst>
+              <a:gd name="adj1" fmla="val 25000"/>
+              <a:gd name="adj2" fmla="val 50000"/>
+              <a:gd name="adj3" fmla="val 33382"/>
+            </a:avLst>
+          </a:prstGeom>
+          <a:solidFill>
+            <a:schemeClr val="tx2"/>
+          </a:solidFill>
+          <a:ln w="9525" cap="flat" cmpd="sng" algn="ctr">
+            <a:noFill/>
+            <a:prstDash val="solid"/>
+            <a:round/>
+            <a:headEnd type="none" w="med" len="med"/>
+            <a:tailEnd type="none" w="med" len="med"/>
+          </a:ln>
+          <a:effectLst/>
+        </p:spPr>
+        <p:txBody>
+          <a:bodyPr vert="horz" wrap="none" lIns="0" tIns="0" rIns="0" bIns="0" numCol="1" rtlCol="0" anchor="ctr" anchorCtr="0" compatLnSpc="1">
+            <a:prstTxWarp prst="textNoShape">
+              <a:avLst/>
+            </a:prstTxWarp>
+          </a:bodyPr>
+          <a:lstStyle/>
+          <a:p>
+            <a:pPr marL="0" marR="0" indent="0" algn="ctr" defTabSz="803275" rtl="0" eaLnBrk="1" fontAlgn="base" latinLnBrk="0" hangingPunct="1">
+              <a:lnSpc>
+                <a:spcPct val="130000"/>
+              </a:lnSpc>
+              <a:spcBef>
+                <a:spcPct val="0"/>
+              </a:spcBef>
+              <a:spcAft>
+                <a:spcPct val="0"/>
+              </a:spcAft>
+              <a:buClrTx/>
+              <a:buSzPct val="120000"/>
+              <a:buFontTx/>
+              <a:buNone/>
+              <a:tabLst/>
+            </a:pPr>
+            <a:endParaRPr kumimoji="0" lang="en-US" sz="1600" b="1" i="0" u="none" strike="noStrike" cap="none" normalizeH="0" baseline="0" smtClean="0">
+              <a:ln>
+                <a:noFill/>
+              </a:ln>
+              <a:solidFill>
+                <a:schemeClr val="tx1"/>
+              </a:solidFill>
+              <a:effectLst/>
+              <a:latin typeface="Arial" charset="0"/>
+            </a:endParaRPr>
+          </a:p>
+        </p:txBody>
+      </p:sp>
+      <p:sp>
+        <p:nvSpPr>
+          <p:cNvPr id="17" name="Curved Right Arrow 16"/>
+          <p:cNvSpPr/>
+          <p:nvPr/>
+        </p:nvSpPr>
+        <p:spPr bwMode="auto">
+          <a:xfrm rot="1967325" flipH="1">
+            <a:off x="6317417" y="2199994"/>
+            <a:ext cx="936104" cy="3792159"/>
+          </a:xfrm>
+          <a:prstGeom prst="curvedRightArrow">
+            <a:avLst>
+              <a:gd name="adj1" fmla="val 25000"/>
+              <a:gd name="adj2" fmla="val 50000"/>
+              <a:gd name="adj3" fmla="val 33382"/>
+            </a:avLst>
+          </a:prstGeom>
+          <a:solidFill>
+            <a:schemeClr val="tx2"/>
+          </a:solidFill>
+          <a:ln w="9525" cap="flat" cmpd="sng" algn="ctr">
+            <a:noFill/>
+            <a:prstDash val="solid"/>
+            <a:round/>
+            <a:headEnd type="none" w="med" len="med"/>
+            <a:tailEnd type="none" w="med" len="med"/>
+          </a:ln>
+          <a:effectLst/>
+        </p:spPr>
+        <p:txBody>
+          <a:bodyPr vert="horz" wrap="none" lIns="0" tIns="0" rIns="0" bIns="0" numCol="1" rtlCol="0" anchor="ctr" anchorCtr="0" compatLnSpc="1">
+            <a:prstTxWarp prst="textNoShape">
+              <a:avLst/>
+            </a:prstTxWarp>
+          </a:bodyPr>
+          <a:lstStyle/>
+          <a:p>
+            <a:pPr marL="0" marR="0" indent="0" algn="ctr" defTabSz="803275" rtl="0" eaLnBrk="1" fontAlgn="base" latinLnBrk="0" hangingPunct="1">
+              <a:lnSpc>
+                <a:spcPct val="130000"/>
+              </a:lnSpc>
+              <a:spcBef>
+                <a:spcPct val="0"/>
+              </a:spcBef>
+              <a:spcAft>
+                <a:spcPct val="0"/>
+              </a:spcAft>
+              <a:buClrTx/>
+              <a:buSzPct val="120000"/>
+              <a:buFontTx/>
+              <a:buNone/>
+              <a:tabLst/>
+            </a:pPr>
+            <a:endParaRPr kumimoji="0" lang="en-US" sz="1600" b="1" i="0" u="none" strike="noStrike" cap="none" normalizeH="0" baseline="0" smtClean="0">
+              <a:ln>
+                <a:noFill/>
+              </a:ln>
+              <a:solidFill>
+                <a:schemeClr val="tx1"/>
+              </a:solidFill>
+              <a:effectLst/>
+              <a:latin typeface="Arial" charset="0"/>
+            </a:endParaRPr>
+          </a:p>
+        </p:txBody>
+      </p:sp>
+      <p:sp>
+        <p:nvSpPr>
+          <p:cNvPr id="8" name="TextBox 7"/>
+          <p:cNvSpPr txBox="1"/>
+          <p:nvPr/>
+        </p:nvSpPr>
+        <p:spPr>
+          <a:xfrm>
+            <a:off x="6119916" y="5262384"/>
+            <a:ext cx="2628797" cy="1200329"/>
+          </a:xfrm>
+          <a:prstGeom prst="rect">
+            <a:avLst/>
+          </a:prstGeom>
+          <a:noFill/>
+        </p:spPr>
+        <p:txBody>
+          <a:bodyPr wrap="none" rtlCol="0">
+            <a:spAutoFit/>
+          </a:bodyPr>
+          <a:lstStyle/>
+          <a:p>
+            <a:r>
+              <a:rPr lang="en-US" dirty="0" err="1" smtClean="0"/>
+              <a:t>IoT</a:t>
+            </a:r>
+            <a:r>
+              <a:rPr lang="en-US" dirty="0" smtClean="0"/>
+              <a:t> WLAN:</a:t>
+            </a:r>
+          </a:p>
+          <a:p>
+            <a:pPr lvl="1"/>
+            <a:r>
+              <a:rPr lang="en-US" dirty="0" smtClean="0"/>
+              <a:t>SSID: “</a:t>
+            </a:r>
+            <a:r>
+              <a:rPr lang="en-US" dirty="0" err="1" smtClean="0"/>
+              <a:t>IoT</a:t>
+            </a:r>
+            <a:r>
+              <a:rPr lang="en-US" dirty="0" smtClean="0"/>
+              <a:t> Campus”</a:t>
+            </a:r>
+          </a:p>
+          <a:p>
+            <a:pPr lvl="1"/>
+            <a:r>
+              <a:rPr lang="en-US" dirty="0" smtClean="0"/>
+              <a:t>PW: “campus2018”</a:t>
+            </a:r>
+          </a:p>
+          <a:p>
+            <a:r>
+              <a:rPr lang="en-US" dirty="0" smtClean="0">
+                <a:sym typeface="Wingdings"/>
+              </a:rPr>
+              <a:t> </a:t>
+            </a:r>
+            <a:r>
+              <a:rPr lang="en-US" dirty="0" smtClean="0"/>
+              <a:t>http://10.0.0.1:1880/</a:t>
+            </a:r>
+            <a:r>
+              <a:rPr lang="en-US" dirty="0" err="1" smtClean="0"/>
+              <a:t>ui</a:t>
+            </a:r>
+            <a:endParaRPr lang="en-US" dirty="0"/>
           </a:p>
         </p:txBody>
       </p:sp>

</xml_diff>